<commit_message>
updated presentation mock up
</commit_message>
<xml_diff>
--- a/Presentation draft.pptx
+++ b/Presentation draft.pptx
@@ -266,7 +266,7 @@
           <a:p>
             <a:fld id="{79F46DAC-C913-4825-8FDF-5BDD39386F52}" type="datetimeFigureOut">
               <a:rPr lang="en-US" smtClean="0"/>
-              <a:t>9/8/2019</a:t>
+              <a:t>9/9/2019</a:t>
             </a:fld>
             <a:endParaRPr lang="en-US"/>
           </a:p>
@@ -464,7 +464,7 @@
           <a:p>
             <a:fld id="{79F46DAC-C913-4825-8FDF-5BDD39386F52}" type="datetimeFigureOut">
               <a:rPr lang="en-US" smtClean="0"/>
-              <a:t>9/8/2019</a:t>
+              <a:t>9/9/2019</a:t>
             </a:fld>
             <a:endParaRPr lang="en-US"/>
           </a:p>
@@ -672,7 +672,7 @@
           <a:p>
             <a:fld id="{79F46DAC-C913-4825-8FDF-5BDD39386F52}" type="datetimeFigureOut">
               <a:rPr lang="en-US" smtClean="0"/>
-              <a:t>9/8/2019</a:t>
+              <a:t>9/9/2019</a:t>
             </a:fld>
             <a:endParaRPr lang="en-US"/>
           </a:p>
@@ -870,7 +870,7 @@
           <a:p>
             <a:fld id="{79F46DAC-C913-4825-8FDF-5BDD39386F52}" type="datetimeFigureOut">
               <a:rPr lang="en-US" smtClean="0"/>
-              <a:t>9/8/2019</a:t>
+              <a:t>9/9/2019</a:t>
             </a:fld>
             <a:endParaRPr lang="en-US"/>
           </a:p>
@@ -1145,7 +1145,7 @@
           <a:p>
             <a:fld id="{79F46DAC-C913-4825-8FDF-5BDD39386F52}" type="datetimeFigureOut">
               <a:rPr lang="en-US" smtClean="0"/>
-              <a:t>9/8/2019</a:t>
+              <a:t>9/9/2019</a:t>
             </a:fld>
             <a:endParaRPr lang="en-US"/>
           </a:p>
@@ -1410,7 +1410,7 @@
           <a:p>
             <a:fld id="{79F46DAC-C913-4825-8FDF-5BDD39386F52}" type="datetimeFigureOut">
               <a:rPr lang="en-US" smtClean="0"/>
-              <a:t>9/8/2019</a:t>
+              <a:t>9/9/2019</a:t>
             </a:fld>
             <a:endParaRPr lang="en-US"/>
           </a:p>
@@ -1822,7 +1822,7 @@
           <a:p>
             <a:fld id="{79F46DAC-C913-4825-8FDF-5BDD39386F52}" type="datetimeFigureOut">
               <a:rPr lang="en-US" smtClean="0"/>
-              <a:t>9/8/2019</a:t>
+              <a:t>9/9/2019</a:t>
             </a:fld>
             <a:endParaRPr lang="en-US"/>
           </a:p>
@@ -1963,7 +1963,7 @@
           <a:p>
             <a:fld id="{79F46DAC-C913-4825-8FDF-5BDD39386F52}" type="datetimeFigureOut">
               <a:rPr lang="en-US" smtClean="0"/>
-              <a:t>9/8/2019</a:t>
+              <a:t>9/9/2019</a:t>
             </a:fld>
             <a:endParaRPr lang="en-US"/>
           </a:p>
@@ -2076,7 +2076,7 @@
           <a:p>
             <a:fld id="{79F46DAC-C913-4825-8FDF-5BDD39386F52}" type="datetimeFigureOut">
               <a:rPr lang="en-US" smtClean="0"/>
-              <a:t>9/8/2019</a:t>
+              <a:t>9/9/2019</a:t>
             </a:fld>
             <a:endParaRPr lang="en-US"/>
           </a:p>
@@ -2387,7 +2387,7 @@
           <a:p>
             <a:fld id="{79F46DAC-C913-4825-8FDF-5BDD39386F52}" type="datetimeFigureOut">
               <a:rPr lang="en-US" smtClean="0"/>
-              <a:t>9/8/2019</a:t>
+              <a:t>9/9/2019</a:t>
             </a:fld>
             <a:endParaRPr lang="en-US"/>
           </a:p>
@@ -2675,7 +2675,7 @@
           <a:p>
             <a:fld id="{79F46DAC-C913-4825-8FDF-5BDD39386F52}" type="datetimeFigureOut">
               <a:rPr lang="en-US" smtClean="0"/>
-              <a:t>9/8/2019</a:t>
+              <a:t>9/9/2019</a:t>
             </a:fld>
             <a:endParaRPr lang="en-US"/>
           </a:p>
@@ -2916,7 +2916,7 @@
           <a:p>
             <a:fld id="{79F46DAC-C913-4825-8FDF-5BDD39386F52}" type="datetimeFigureOut">
               <a:rPr lang="en-US" smtClean="0"/>
-              <a:t>9/8/2019</a:t>
+              <a:t>9/9/2019</a:t>
             </a:fld>
             <a:endParaRPr lang="en-US"/>
           </a:p>
@@ -3613,7 +3613,7 @@
                   <a:srgbClr val="000000"/>
                 </a:solidFill>
               </a:rPr>
-              <a:t>How does the danceability quality of songs change over time?</a:t>
+              <a:t>How does the danceability and other music attributes change over time?</a:t>
             </a:r>
           </a:p>
           <a:p>
@@ -4145,7 +4145,7 @@
           <a:lstStyle/>
           <a:p>
             <a:r>
-              <a:rPr lang="en-US" sz="1700">
+              <a:rPr lang="en-US" sz="1700" dirty="0">
                 <a:solidFill>
                   <a:srgbClr val="000000"/>
                 </a:solidFill>
@@ -4158,19 +4158,35 @@
               <a:buNone/>
             </a:pPr>
             <a:r>
-              <a:rPr lang="en-US" sz="1700">
+              <a:rPr lang="en-US" sz="1700" dirty="0">
                 <a:solidFill>
                   <a:srgbClr val="000000"/>
                 </a:solidFill>
               </a:rPr>
-              <a:t>Streams daily updated urls, classified by music genre and countries (over 130 countries and 167 music genres)</a:t>
+              <a:t>Streams daily updated </a:t>
+            </a:r>
+            <a:r>
+              <a:rPr lang="en-US" sz="1700" dirty="0" err="1">
+                <a:solidFill>
+                  <a:srgbClr val="000000"/>
+                </a:solidFill>
+              </a:rPr>
+              <a:t>urls</a:t>
+            </a:r>
+            <a:r>
+              <a:rPr lang="en-US" sz="1700" dirty="0">
+                <a:solidFill>
+                  <a:srgbClr val="000000"/>
+                </a:solidFill>
+              </a:rPr>
+              <a:t>, classified by music genre and countries (over 130 countries and 167 music genres)</a:t>
             </a:r>
           </a:p>
           <a:p>
             <a:pPr marL="0" indent="0">
               <a:buNone/>
             </a:pPr>
-            <a:endParaRPr lang="en-US" sz="1700">
+            <a:endParaRPr lang="en-US" sz="1700" dirty="0">
               <a:solidFill>
                 <a:srgbClr val="000000"/>
               </a:solidFill>
@@ -4178,7 +4194,7 @@
           </a:p>
           <a:p>
             <a:r>
-              <a:rPr lang="en-US" sz="1700">
+              <a:rPr lang="en-US" sz="1700" dirty="0">
                 <a:solidFill>
                   <a:srgbClr val="000000"/>
                 </a:solidFill>
@@ -4191,12 +4207,28 @@
               <a:buNone/>
             </a:pPr>
             <a:r>
-              <a:rPr lang="en-US" sz="1700">
+              <a:rPr lang="en-US" sz="1700" dirty="0">
                 <a:solidFill>
                   <a:srgbClr val="000000"/>
                 </a:solidFill>
               </a:rPr>
-              <a:t>Builds a detailed profile of user’s musical taste by recording details of the tracks listened from internet radio stations, users’ computers, or portable music devices. Information is transferred to Last.fm’s database either via the music player itself (Spotify, Deezer, Tidal, etc.) or via a plug-in installed into users’ music player.</a:t>
+              <a:t>Builds a detailed profile of user’s musical taste by recording details of the tracks listened from internet radio stations, users’ computers, or portable music devices. Information is transferred to </a:t>
+            </a:r>
+            <a:r>
+              <a:rPr lang="en-US" sz="1700" dirty="0" err="1">
+                <a:solidFill>
+                  <a:srgbClr val="000000"/>
+                </a:solidFill>
+              </a:rPr>
+              <a:t>Last.fm’s</a:t>
+            </a:r>
+            <a:r>
+              <a:rPr lang="en-US" sz="1700" dirty="0">
+                <a:solidFill>
+                  <a:srgbClr val="000000"/>
+                </a:solidFill>
+              </a:rPr>
+              <a:t> database either via the music player itself (Spotify, Deezer, Tidal, etc.) or via a plug-in installed into users’ music player.</a:t>
             </a:r>
           </a:p>
         </p:txBody>
@@ -4443,39 +4475,27 @@
                   <a:srgbClr val="000000"/>
                 </a:solidFill>
               </a:rPr>
-              <a:t>Using the Billboard Hot 100 </a:t>
-            </a:r>
-            <a:r>
-              <a:rPr lang="en-US" sz="2000" dirty="0" err="1">
-                <a:solidFill>
-                  <a:srgbClr val="000000"/>
-                </a:solidFill>
-              </a:rPr>
-              <a:t>url</a:t>
-            </a:r>
+              <a:t>Using the Billboard Hot 100 URL and API key, a dataset was extracted to begin the analysis. The information was cleaned and formatted and saved on a csv file. </a:t>
+            </a:r>
+          </a:p>
+          <a:p>
             <a:r>
               <a:rPr lang="en-US" sz="2000" dirty="0">
                 <a:solidFill>
                   <a:srgbClr val="000000"/>
                 </a:solidFill>
               </a:rPr>
-              <a:t> and </a:t>
-            </a:r>
-            <a:r>
-              <a:rPr lang="en-US" sz="2000" dirty="0" err="1">
-                <a:solidFill>
-                  <a:srgbClr val="000000"/>
-                </a:solidFill>
-              </a:rPr>
-              <a:t>api</a:t>
-            </a:r>
+              <a:t>Using pandas and jupyter notebook, we grabbed different elements of the dataset to analyze the information in Data Frames and plots. </a:t>
+            </a:r>
+          </a:p>
+          <a:p>
             <a:r>
               <a:rPr lang="en-US" sz="2000" dirty="0">
                 <a:solidFill>
                   <a:srgbClr val="000000"/>
                 </a:solidFill>
               </a:rPr>
-              <a:t> key, a dataset was extracted to begin the analysis</a:t>
+              <a:t>The same process was followed for additional API’s used to have a separate dataset and make a similar analysis to verify if the trends were similar to what our analysis on Billboard Hot 100 is showing.</a:t>
             </a:r>
           </a:p>
         </p:txBody>
@@ -4666,7 +4686,7 @@
         </p:nvSpPr>
         <p:spPr>
           <a:xfrm>
-            <a:off x="1179226" y="826681"/>
+            <a:off x="1179074" y="547814"/>
             <a:ext cx="9833548" cy="610234"/>
           </a:xfrm>
         </p:spPr>
@@ -4677,42 +4697,156 @@
           <a:lstStyle/>
           <a:p>
             <a:pPr algn="ctr"/>
-            <a:endParaRPr lang="en-US" sz="4000" dirty="0">
+            <a:r>
+              <a:rPr lang="en-US" sz="4000" dirty="0">
+                <a:solidFill>
+                  <a:srgbClr val="FFFFFF"/>
+                </a:solidFill>
+              </a:rPr>
+              <a:t>Popular Genre changes over the years (2000-2017)</a:t>
+            </a:r>
+          </a:p>
+        </p:txBody>
+      </p:sp>
+      <p:sp>
+        <p:nvSpPr>
+          <p:cNvPr id="3" name="Content Placeholder 2">
+            <a:extLst>
+              <a:ext uri="{FF2B5EF4-FFF2-40B4-BE49-F238E27FC236}">
+                <a16:creationId xmlns:a16="http://schemas.microsoft.com/office/drawing/2014/main" id="{8D3F97B8-59CA-4F01-8D20-F691D0D14009}"/>
+              </a:ext>
+            </a:extLst>
+          </p:cNvPr>
+          <p:cNvSpPr>
+            <a:spLocks noGrp="1"/>
+          </p:cNvSpPr>
+          <p:nvPr>
+            <p:ph idx="1"/>
+          </p:nvPr>
+        </p:nvSpPr>
+        <p:spPr>
+          <a:xfrm>
+            <a:off x="1179074" y="1134984"/>
+            <a:ext cx="9833548" cy="2219195"/>
+          </a:xfrm>
+        </p:spPr>
+        <p:txBody>
+          <a:bodyPr>
+            <a:normAutofit fontScale="70000" lnSpcReduction="20000"/>
+          </a:bodyPr>
+          <a:lstStyle/>
+          <a:p>
+            <a:pPr marL="0" indent="0">
+              <a:buNone/>
+            </a:pPr>
+            <a:r>
+              <a:rPr lang="en-US" sz="1600" dirty="0">
+                <a:solidFill>
+                  <a:schemeClr val="bg1"/>
+                </a:solidFill>
+              </a:rPr>
+              <a:t>In the plots below, “Number of hits by genre” refers to the number of times a song tagged with a particular genre was part of the Billboard Hot 100. The count was used to look at the trend of the most tagged genres per Billboard. </a:t>
+            </a:r>
+          </a:p>
+          <a:p>
+            <a:r>
+              <a:rPr lang="en-US" sz="1600" dirty="0">
+                <a:solidFill>
+                  <a:schemeClr val="bg1"/>
+                </a:solidFill>
+              </a:rPr>
+              <a:t>Tracks without a clear genre definition, were tagged in the Billboard list as “Unknown”</a:t>
+            </a:r>
+          </a:p>
+          <a:p>
+            <a:r>
+              <a:rPr lang="en-US" sz="1600" dirty="0">
+                <a:solidFill>
+                  <a:schemeClr val="bg1"/>
+                </a:solidFill>
+              </a:rPr>
+              <a:t>Rap songs significantly increased on popularity starting 2014. </a:t>
+            </a:r>
+          </a:p>
+          <a:p>
+            <a:r>
+              <a:rPr lang="en-US" sz="1600" dirty="0">
+                <a:solidFill>
+                  <a:schemeClr val="bg1"/>
+                </a:solidFill>
+              </a:rPr>
+              <a:t>Pop music had a spike in 2010, its popularity decreased by 2012 and slightly went back up towards 2017. </a:t>
+            </a:r>
+          </a:p>
+          <a:p>
+            <a:r>
+              <a:rPr lang="en-US" sz="1600" dirty="0"/>
+              <a:t>Popularity of Country music has somehow remained stable </a:t>
+            </a:r>
+            <a:r>
+              <a:rPr lang="en-US" sz="1600" dirty="0">
+                <a:solidFill>
+                  <a:schemeClr val="bg1"/>
+                </a:solidFill>
+              </a:rPr>
+              <a:t>over the years analyzed, with some small spikes on 2009 and 2014, in 2017 it was higher than most </a:t>
+            </a:r>
+            <a:r>
+              <a:rPr lang="en-US" sz="1600" dirty="0">
+                <a:solidFill>
+                  <a:srgbClr val="000000"/>
+                </a:solidFill>
+              </a:rPr>
+              <a:t>genres, below Rap and Pop.</a:t>
+            </a:r>
+          </a:p>
+          <a:p>
+            <a:r>
+              <a:rPr lang="en-US" sz="1600" dirty="0">
+                <a:solidFill>
+                  <a:srgbClr val="000000"/>
+                </a:solidFill>
+              </a:rPr>
+              <a:t>EDM popularity has remained constant over the years.</a:t>
+            </a:r>
+          </a:p>
+          <a:p>
+            <a:pPr marL="0" indent="0">
+              <a:buNone/>
+            </a:pPr>
+            <a:r>
+              <a:rPr lang="en-US" sz="1600" dirty="0">
+                <a:solidFill>
+                  <a:srgbClr val="000000"/>
+                </a:solidFill>
+              </a:rPr>
+              <a:t>Last.fm data is showing only the current year’s most popular songs (as of August 2019) according to it, Rock is by far the most popular genre streamed, followed by electronic. However, streams from users in other countries are included in this information. We did not have an easy way to extract comparable information to Billboard.</a:t>
+            </a:r>
+          </a:p>
+          <a:p>
+            <a:pPr marL="0" indent="0">
+              <a:buNone/>
+            </a:pPr>
+            <a:endParaRPr lang="en-US" sz="1600" dirty="0">
               <a:solidFill>
-                <a:srgbClr val="FFFFFF"/>
+                <a:srgbClr val="000000"/>
               </a:solidFill>
             </a:endParaRPr>
           </a:p>
-        </p:txBody>
-      </p:sp>
-      <p:sp>
-        <p:nvSpPr>
-          <p:cNvPr id="3" name="Content Placeholder 2">
-            <a:extLst>
-              <a:ext uri="{FF2B5EF4-FFF2-40B4-BE49-F238E27FC236}">
-                <a16:creationId xmlns:a16="http://schemas.microsoft.com/office/drawing/2014/main" id="{8D3F97B8-59CA-4F01-8D20-F691D0D14009}"/>
-              </a:ext>
-            </a:extLst>
-          </p:cNvPr>
-          <p:cNvSpPr>
-            <a:spLocks noGrp="1"/>
-          </p:cNvSpPr>
-          <p:nvPr>
-            <p:ph idx="1"/>
-          </p:nvPr>
-        </p:nvSpPr>
-        <p:spPr>
-          <a:xfrm>
-            <a:off x="1179226" y="2006926"/>
-            <a:ext cx="9833548" cy="1422074"/>
-          </a:xfrm>
-        </p:spPr>
-        <p:txBody>
-          <a:bodyPr>
-            <a:normAutofit/>
-          </a:bodyPr>
-          <a:lstStyle/>
-          <a:p>
+          <a:p>
+            <a:pPr marL="0" indent="0">
+              <a:buNone/>
+            </a:pPr>
+            <a:endParaRPr lang="en-US" sz="2000" dirty="0">
+              <a:solidFill>
+                <a:srgbClr val="000000"/>
+              </a:solidFill>
+            </a:endParaRPr>
+          </a:p>
+          <a:p>
+            <a:pPr marL="0" indent="0">
+              <a:buNone/>
+            </a:pPr>
             <a:endParaRPr lang="en-US" sz="2000" dirty="0">
               <a:solidFill>
                 <a:srgbClr val="000000"/>
@@ -4773,7 +4907,7 @@
         </p:blipFill>
         <p:spPr>
           <a:xfrm>
-            <a:off x="6095848" y="3580617"/>
+            <a:off x="6095848" y="3601706"/>
             <a:ext cx="3970020" cy="2879542"/>
           </a:xfrm>
           <a:prstGeom prst="rect">
@@ -4967,8 +5101,8 @@
         </p:nvSpPr>
         <p:spPr>
           <a:xfrm>
-            <a:off x="1179226" y="826680"/>
-            <a:ext cx="9833548" cy="675549"/>
+            <a:off x="1179226" y="742376"/>
+            <a:ext cx="9833548" cy="669963"/>
           </a:xfrm>
         </p:spPr>
         <p:txBody>
@@ -4978,11 +5112,14 @@
           <a:lstStyle/>
           <a:p>
             <a:pPr algn="ctr"/>
-            <a:endParaRPr lang="en-US" sz="4000" dirty="0">
-              <a:solidFill>
-                <a:srgbClr val="FFFFFF"/>
-              </a:solidFill>
-            </a:endParaRPr>
+            <a:r>
+              <a:rPr lang="en-US" sz="4000" dirty="0">
+                <a:solidFill>
+                  <a:srgbClr val="FFFFFF"/>
+                </a:solidFill>
+              </a:rPr>
+              <a:t>Danceability by genre between 2000-2017</a:t>
+            </a:r>
           </a:p>
         </p:txBody>
       </p:sp>
@@ -5004,8 +5141,8 @@
         </p:nvSpPr>
         <p:spPr>
           <a:xfrm>
-            <a:off x="1179226" y="2017812"/>
-            <a:ext cx="9833548" cy="943102"/>
+            <a:off x="1179074" y="1380773"/>
+            <a:ext cx="9833548" cy="1362641"/>
           </a:xfrm>
         </p:spPr>
         <p:txBody>
@@ -5014,11 +5151,14 @@
           </a:bodyPr>
           <a:lstStyle/>
           <a:p>
-            <a:endParaRPr lang="en-US" sz="2000" dirty="0">
-              <a:solidFill>
-                <a:srgbClr val="000000"/>
-              </a:solidFill>
-            </a:endParaRPr>
+            <a:r>
+              <a:rPr lang="en-US" sz="2000" dirty="0">
+                <a:solidFill>
+                  <a:schemeClr val="bg1"/>
+                </a:solidFill>
+              </a:rPr>
+              <a:t>According to Spotify, “Danceability” refers to how suitable a track is for dancing, based on a combination of music elements including tempo, rhythm stability, beat strength, and overall regularity. The value 0.0 is the least danceable and 1.0 is the most danceable.</a:t>
+            </a:r>
           </a:p>
         </p:txBody>
       </p:sp>
@@ -5044,7 +5184,7 @@
         </p:blipFill>
         <p:spPr>
           <a:xfrm>
-            <a:off x="1179225" y="3269519"/>
+            <a:off x="1179225" y="3169753"/>
             <a:ext cx="4633745" cy="3065451"/>
           </a:xfrm>
           <a:prstGeom prst="rect">
@@ -5074,8 +5214,8 @@
         </p:blipFill>
         <p:spPr>
           <a:xfrm>
-            <a:off x="6379031" y="3428999"/>
-            <a:ext cx="3875311" cy="2916241"/>
+            <a:off x="6379032" y="3304828"/>
+            <a:ext cx="3901310" cy="2935806"/>
           </a:xfrm>
           <a:prstGeom prst="rect">
             <a:avLst/>
@@ -5287,6 +5427,18 @@
               </a:rPr>
               <a:t>Billboard Hot  100 vs Last.fm – Top Artists</a:t>
             </a:r>
+            <a:br>
+              <a:rPr lang="en-US" sz="4000" dirty="0">
+                <a:solidFill>
+                  <a:srgbClr val="FFFFFF"/>
+                </a:solidFill>
+              </a:rPr>
+            </a:br>
+            <a:endParaRPr lang="en-US" sz="4000" dirty="0">
+              <a:solidFill>
+                <a:srgbClr val="FFFFFF"/>
+              </a:solidFill>
+            </a:endParaRPr>
           </a:p>
         </p:txBody>
       </p:sp>
@@ -5538,22 +5690,25 @@
         </p:nvSpPr>
         <p:spPr>
           <a:xfrm>
-            <a:off x="1179226" y="826681"/>
-            <a:ext cx="9833548" cy="610234"/>
+            <a:off x="1179226" y="612728"/>
+            <a:ext cx="9833548" cy="824187"/>
           </a:xfrm>
         </p:spPr>
         <p:txBody>
           <a:bodyPr>
-            <a:normAutofit fontScale="90000"/>
+            <a:normAutofit/>
           </a:bodyPr>
           <a:lstStyle/>
           <a:p>
             <a:pPr algn="ctr"/>
-            <a:endParaRPr lang="en-US" sz="4000" dirty="0">
-              <a:solidFill>
-                <a:srgbClr val="FFFFFF"/>
-              </a:solidFill>
-            </a:endParaRPr>
+            <a:r>
+              <a:rPr lang="en-US" sz="1600" dirty="0">
+                <a:solidFill>
+                  <a:srgbClr val="FFFFFF"/>
+                </a:solidFill>
+              </a:rPr>
+              <a:t>The challenge with the information pulled from the Rapid API was that Radio stations playing hits did not favor any genres, that is where the “Music” label comes from. The plots below show the top 5 genre by radio station in 4 different countries.</a:t>
+            </a:r>
           </a:p>
         </p:txBody>
       </p:sp>

</xml_diff>